<commit_message>
Fix the pictures style in the presentation
</commit_message>
<xml_diff>
--- a/documentation and presentation/Psychopaths2.pptx
+++ b/documentation and presentation/Psychopaths2.pptx
@@ -267,7 +267,7 @@
           <a:p>
             <a:fld id="{A0CB4A69-CDFD-438F-892F-50E28215116C}" type="datetimeFigureOut">
               <a:rPr lang="bg-BG" smtClean="0"/>
-              <a:t>12.12.2022 г.</a:t>
+              <a:t>14.12.2022 г.</a:t>
             </a:fld>
             <a:endParaRPr lang="bg-BG"/>
           </a:p>
@@ -467,7 +467,7 @@
           <a:p>
             <a:fld id="{A0CB4A69-CDFD-438F-892F-50E28215116C}" type="datetimeFigureOut">
               <a:rPr lang="bg-BG" smtClean="0"/>
-              <a:t>12.12.2022 г.</a:t>
+              <a:t>14.12.2022 г.</a:t>
             </a:fld>
             <a:endParaRPr lang="bg-BG"/>
           </a:p>
@@ -677,7 +677,7 @@
           <a:p>
             <a:fld id="{A0CB4A69-CDFD-438F-892F-50E28215116C}" type="datetimeFigureOut">
               <a:rPr lang="bg-BG" smtClean="0"/>
-              <a:t>12.12.2022 г.</a:t>
+              <a:t>14.12.2022 г.</a:t>
             </a:fld>
             <a:endParaRPr lang="bg-BG"/>
           </a:p>
@@ -877,7 +877,7 @@
           <a:p>
             <a:fld id="{A0CB4A69-CDFD-438F-892F-50E28215116C}" type="datetimeFigureOut">
               <a:rPr lang="bg-BG" smtClean="0"/>
-              <a:t>12.12.2022 г.</a:t>
+              <a:t>14.12.2022 г.</a:t>
             </a:fld>
             <a:endParaRPr lang="bg-BG"/>
           </a:p>
@@ -1153,7 +1153,7 @@
           <a:p>
             <a:fld id="{A0CB4A69-CDFD-438F-892F-50E28215116C}" type="datetimeFigureOut">
               <a:rPr lang="bg-BG" smtClean="0"/>
-              <a:t>12.12.2022 г.</a:t>
+              <a:t>14.12.2022 г.</a:t>
             </a:fld>
             <a:endParaRPr lang="bg-BG"/>
           </a:p>
@@ -1421,7 +1421,7 @@
           <a:p>
             <a:fld id="{A0CB4A69-CDFD-438F-892F-50E28215116C}" type="datetimeFigureOut">
               <a:rPr lang="bg-BG" smtClean="0"/>
-              <a:t>12.12.2022 г.</a:t>
+              <a:t>14.12.2022 г.</a:t>
             </a:fld>
             <a:endParaRPr lang="bg-BG"/>
           </a:p>
@@ -1836,7 +1836,7 @@
           <a:p>
             <a:fld id="{A0CB4A69-CDFD-438F-892F-50E28215116C}" type="datetimeFigureOut">
               <a:rPr lang="bg-BG" smtClean="0"/>
-              <a:t>12.12.2022 г.</a:t>
+              <a:t>14.12.2022 г.</a:t>
             </a:fld>
             <a:endParaRPr lang="bg-BG"/>
           </a:p>
@@ -1978,7 +1978,7 @@
           <a:p>
             <a:fld id="{A0CB4A69-CDFD-438F-892F-50E28215116C}" type="datetimeFigureOut">
               <a:rPr lang="bg-BG" smtClean="0"/>
-              <a:t>12.12.2022 г.</a:t>
+              <a:t>14.12.2022 г.</a:t>
             </a:fld>
             <a:endParaRPr lang="bg-BG"/>
           </a:p>
@@ -2091,7 +2091,7 @@
           <a:p>
             <a:fld id="{A0CB4A69-CDFD-438F-892F-50E28215116C}" type="datetimeFigureOut">
               <a:rPr lang="bg-BG" smtClean="0"/>
-              <a:t>12.12.2022 г.</a:t>
+              <a:t>14.12.2022 г.</a:t>
             </a:fld>
             <a:endParaRPr lang="bg-BG"/>
           </a:p>
@@ -2404,7 +2404,7 @@
           <a:p>
             <a:fld id="{A0CB4A69-CDFD-438F-892F-50E28215116C}" type="datetimeFigureOut">
               <a:rPr lang="bg-BG" smtClean="0"/>
-              <a:t>12.12.2022 г.</a:t>
+              <a:t>14.12.2022 г.</a:t>
             </a:fld>
             <a:endParaRPr lang="bg-BG"/>
           </a:p>
@@ -2693,7 +2693,7 @@
           <a:p>
             <a:fld id="{A0CB4A69-CDFD-438F-892F-50E28215116C}" type="datetimeFigureOut">
               <a:rPr lang="bg-BG" smtClean="0"/>
-              <a:t>12.12.2022 г.</a:t>
+              <a:t>14.12.2022 г.</a:t>
             </a:fld>
             <a:endParaRPr lang="bg-BG"/>
           </a:p>
@@ -2936,7 +2936,7 @@
           <a:p>
             <a:fld id="{A0CB4A69-CDFD-438F-892F-50E28215116C}" type="datetimeFigureOut">
               <a:rPr lang="bg-BG" smtClean="0"/>
-              <a:t>12.12.2022 г.</a:t>
+              <a:t>14.12.2022 г.</a:t>
             </a:fld>
             <a:endParaRPr lang="bg-BG"/>
           </a:p>
@@ -3528,6 +3528,12 @@
           <a:prstGeom prst="rect">
             <a:avLst/>
           </a:prstGeom>
+          <a:ln>
+            <a:noFill/>
+          </a:ln>
+          <a:effectLst>
+            <a:softEdge rad="112500"/>
+          </a:effectLst>
         </p:spPr>
       </p:pic>
       <p:pic>
@@ -3558,6 +3564,12 @@
           <a:prstGeom prst="rect">
             <a:avLst/>
           </a:prstGeom>
+          <a:ln>
+            <a:noFill/>
+          </a:ln>
+          <a:effectLst>
+            <a:softEdge rad="112500"/>
+          </a:effectLst>
         </p:spPr>
       </p:pic>
       <p:pic>
@@ -3588,6 +3600,12 @@
           <a:prstGeom prst="rect">
             <a:avLst/>
           </a:prstGeom>
+          <a:ln>
+            <a:noFill/>
+          </a:ln>
+          <a:effectLst>
+            <a:softEdge rad="112500"/>
+          </a:effectLst>
         </p:spPr>
       </p:pic>
       <p:pic>
@@ -3618,6 +3636,12 @@
           <a:prstGeom prst="rect">
             <a:avLst/>
           </a:prstGeom>
+          <a:ln>
+            <a:noFill/>
+          </a:ln>
+          <a:effectLst>
+            <a:softEdge rad="112500"/>
+          </a:effectLst>
         </p:spPr>
       </p:pic>
       <p:sp>

</xml_diff>